<commit_message>
added physical stats charts
</commit_message>
<xml_diff>
--- a/PROJECT 1 - Presentation.pptx
+++ b/PROJECT 1 - Presentation.pptx
@@ -11,17 +11,27 @@
     <p:sldId id="259" r:id="rId5"/>
     <p:sldId id="268" r:id="rId6"/>
     <p:sldId id="266" r:id="rId7"/>
-    <p:sldId id="267" r:id="rId8"/>
-    <p:sldId id="269" r:id="rId9"/>
-    <p:sldId id="260" r:id="rId10"/>
-    <p:sldId id="270" r:id="rId11"/>
-    <p:sldId id="264" r:id="rId12"/>
-    <p:sldId id="271" r:id="rId13"/>
-    <p:sldId id="265" r:id="rId14"/>
-    <p:sldId id="272" r:id="rId15"/>
-    <p:sldId id="261" r:id="rId16"/>
-    <p:sldId id="262" r:id="rId17"/>
-    <p:sldId id="263" r:id="rId18"/>
+    <p:sldId id="273" r:id="rId8"/>
+    <p:sldId id="274" r:id="rId9"/>
+    <p:sldId id="267" r:id="rId10"/>
+    <p:sldId id="269" r:id="rId11"/>
+    <p:sldId id="275" r:id="rId12"/>
+    <p:sldId id="276" r:id="rId13"/>
+    <p:sldId id="260" r:id="rId14"/>
+    <p:sldId id="270" r:id="rId15"/>
+    <p:sldId id="277" r:id="rId16"/>
+    <p:sldId id="278" r:id="rId17"/>
+    <p:sldId id="264" r:id="rId18"/>
+    <p:sldId id="271" r:id="rId19"/>
+    <p:sldId id="279" r:id="rId20"/>
+    <p:sldId id="280" r:id="rId21"/>
+    <p:sldId id="265" r:id="rId22"/>
+    <p:sldId id="272" r:id="rId23"/>
+    <p:sldId id="281" r:id="rId24"/>
+    <p:sldId id="282" r:id="rId25"/>
+    <p:sldId id="261" r:id="rId26"/>
+    <p:sldId id="262" r:id="rId27"/>
+    <p:sldId id="263" r:id="rId28"/>
   </p:sldIdLst>
   <p:sldSz cx="12192000" cy="6858000"/>
   <p:notesSz cx="6858000" cy="9144000"/>
@@ -4023,7 +4033,7 @@
         <p:spPr>
           <a:xfrm>
             <a:off x="1380931" y="181947"/>
-            <a:ext cx="9601200" cy="676469"/>
+            <a:ext cx="9601200" cy="629816"/>
           </a:xfrm>
         </p:spPr>
         <p:txBody>
@@ -4035,17 +4045,17 @@
             <a:pPr algn="ctr"/>
             <a:r>
               <a:rPr lang="en-US" dirty="0"/>
-              <a:t>100 Meter Percent Change</a:t>
+              <a:t>Discus Percent Change</a:t>
             </a:r>
           </a:p>
         </p:txBody>
       </p:sp>
       <p:pic>
         <p:nvPicPr>
-          <p:cNvPr id="6146" name="Picture 2">
+          <p:cNvPr id="4100" name="Picture 4">
             <a:extLst>
               <a:ext uri="{FF2B5EF4-FFF2-40B4-BE49-F238E27FC236}">
-                <a16:creationId xmlns:a16="http://schemas.microsoft.com/office/drawing/2014/main" id="{0640FBD5-0F66-4FF2-AAFB-2BCA27579134}"/>
+                <a16:creationId xmlns:a16="http://schemas.microsoft.com/office/drawing/2014/main" id="{07FE2366-562B-4B60-BAC7-E6867AA2AB1E}"/>
               </a:ext>
             </a:extLst>
           </p:cNvPr>
@@ -4071,8 +4081,8 @@
         </p:blipFill>
         <p:spPr bwMode="auto">
           <a:xfrm>
-            <a:off x="1909737" y="981226"/>
-            <a:ext cx="8372526" cy="5694827"/>
+            <a:off x="1847966" y="942393"/>
+            <a:ext cx="8496067" cy="5733660"/>
           </a:xfrm>
           <a:prstGeom prst="rect">
             <a:avLst/>
@@ -4092,7 +4102,7 @@
     </p:spTree>
     <p:extLst>
       <p:ext uri="{BB962C8B-B14F-4D97-AF65-F5344CB8AC3E}">
-        <p14:creationId xmlns:p14="http://schemas.microsoft.com/office/powerpoint/2010/main" val="2598118734"/>
+        <p14:creationId xmlns:p14="http://schemas.microsoft.com/office/powerpoint/2010/main" val="4095095519"/>
       </p:ext>
     </p:extLst>
   </p:cSld>
@@ -4158,17 +4168,17 @@
             <a:pPr algn="ctr"/>
             <a:r>
               <a:rPr lang="en-US" dirty="0"/>
-              <a:t>800 Meter Results</a:t>
+              <a:t>Discus Men’s Physical Stats</a:t>
             </a:r>
           </a:p>
         </p:txBody>
       </p:sp>
       <p:pic>
         <p:nvPicPr>
-          <p:cNvPr id="7170" name="Picture 2">
+          <p:cNvPr id="2050" name="Picture 2">
             <a:extLst>
               <a:ext uri="{FF2B5EF4-FFF2-40B4-BE49-F238E27FC236}">
-                <a16:creationId xmlns:a16="http://schemas.microsoft.com/office/drawing/2014/main" id="{AEF8D83D-210A-4B89-989D-8A472D97D1CF}"/>
+                <a16:creationId xmlns:a16="http://schemas.microsoft.com/office/drawing/2014/main" id="{B85F7E29-D575-488F-8543-605B154C7088}"/>
               </a:ext>
             </a:extLst>
           </p:cNvPr>
@@ -4194,8 +4204,8 @@
         </p:blipFill>
         <p:spPr bwMode="auto">
           <a:xfrm>
-            <a:off x="1891038" y="984381"/>
-            <a:ext cx="8409923" cy="5701003"/>
+            <a:off x="2215305" y="1107347"/>
+            <a:ext cx="8086376" cy="5390917"/>
           </a:xfrm>
           <a:prstGeom prst="rect">
             <a:avLst/>
@@ -4215,7 +4225,7 @@
     </p:spTree>
     <p:extLst>
       <p:ext uri="{BB962C8B-B14F-4D97-AF65-F5344CB8AC3E}">
-        <p14:creationId xmlns:p14="http://schemas.microsoft.com/office/powerpoint/2010/main" val="2744490753"/>
+        <p14:creationId xmlns:p14="http://schemas.microsoft.com/office/powerpoint/2010/main" val="2278589348"/>
       </p:ext>
     </p:extLst>
   </p:cSld>
@@ -4281,17 +4291,17 @@
             <a:pPr algn="ctr"/>
             <a:r>
               <a:rPr lang="en-US" dirty="0"/>
-              <a:t>800 Meter Percent Change</a:t>
+              <a:t>Discus Women’s Physical Stats</a:t>
             </a:r>
           </a:p>
         </p:txBody>
       </p:sp>
       <p:pic>
         <p:nvPicPr>
-          <p:cNvPr id="8194" name="Picture 2">
+          <p:cNvPr id="3074" name="Picture 2">
             <a:extLst>
               <a:ext uri="{FF2B5EF4-FFF2-40B4-BE49-F238E27FC236}">
-                <a16:creationId xmlns:a16="http://schemas.microsoft.com/office/drawing/2014/main" id="{95A88D5F-7DF4-4BCC-984E-C8351A1BC93D}"/>
+                <a16:creationId xmlns:a16="http://schemas.microsoft.com/office/drawing/2014/main" id="{042EE9C5-B6CC-41AC-9593-6200DA0DA49E}"/>
               </a:ext>
             </a:extLst>
           </p:cNvPr>
@@ -4317,8 +4327,8 @@
         </p:blipFill>
         <p:spPr bwMode="auto">
           <a:xfrm>
-            <a:off x="1925535" y="1002718"/>
-            <a:ext cx="8340929" cy="5673335"/>
+            <a:off x="1966824" y="1040234"/>
+            <a:ext cx="8258351" cy="5505567"/>
           </a:xfrm>
           <a:prstGeom prst="rect">
             <a:avLst/>
@@ -4338,7 +4348,7 @@
     </p:spTree>
     <p:extLst>
       <p:ext uri="{BB962C8B-B14F-4D97-AF65-F5344CB8AC3E}">
-        <p14:creationId xmlns:p14="http://schemas.microsoft.com/office/powerpoint/2010/main" val="1575393097"/>
+        <p14:creationId xmlns:p14="http://schemas.microsoft.com/office/powerpoint/2010/main" val="507417743"/>
       </p:ext>
     </p:extLst>
   </p:cSld>
@@ -4392,7 +4402,7 @@
         <p:spPr>
           <a:xfrm>
             <a:off x="1380931" y="181947"/>
-            <a:ext cx="9601200" cy="665341"/>
+            <a:ext cx="9601200" cy="676469"/>
           </a:xfrm>
         </p:spPr>
         <p:txBody>
@@ -4404,17 +4414,17 @@
             <a:pPr algn="ctr"/>
             <a:r>
               <a:rPr lang="en-US" dirty="0"/>
-              <a:t>10,000 Meter Results</a:t>
+              <a:t>100 Meter Results</a:t>
             </a:r>
           </a:p>
         </p:txBody>
       </p:sp>
       <p:pic>
         <p:nvPicPr>
-          <p:cNvPr id="9218" name="Picture 2">
+          <p:cNvPr id="5124" name="Picture 4">
             <a:extLst>
               <a:ext uri="{FF2B5EF4-FFF2-40B4-BE49-F238E27FC236}">
-                <a16:creationId xmlns:a16="http://schemas.microsoft.com/office/drawing/2014/main" id="{7925DD9A-46C0-49C1-9B62-C83CB20ADA4E}"/>
+                <a16:creationId xmlns:a16="http://schemas.microsoft.com/office/drawing/2014/main" id="{10C51C64-049D-4D43-A3EE-4C499B65E03E}"/>
               </a:ext>
             </a:extLst>
           </p:cNvPr>
@@ -4440,8 +4450,8 @@
         </p:blipFill>
         <p:spPr bwMode="auto">
           <a:xfrm>
-            <a:off x="1786993" y="847288"/>
-            <a:ext cx="8618014" cy="5855209"/>
+            <a:off x="2035700" y="998374"/>
+            <a:ext cx="8330609" cy="5628287"/>
           </a:xfrm>
           <a:prstGeom prst="rect">
             <a:avLst/>
@@ -4461,7 +4471,7 @@
     </p:spTree>
     <p:extLst>
       <p:ext uri="{BB962C8B-B14F-4D97-AF65-F5344CB8AC3E}">
-        <p14:creationId xmlns:p14="http://schemas.microsoft.com/office/powerpoint/2010/main" val="98386956"/>
+        <p14:creationId xmlns:p14="http://schemas.microsoft.com/office/powerpoint/2010/main" val="2578630290"/>
       </p:ext>
     </p:extLst>
   </p:cSld>
@@ -4515,7 +4525,7 @@
         <p:spPr>
           <a:xfrm>
             <a:off x="1380931" y="181947"/>
-            <a:ext cx="9601200" cy="665341"/>
+            <a:ext cx="9601200" cy="676469"/>
           </a:xfrm>
         </p:spPr>
         <p:txBody>
@@ -4527,17 +4537,17 @@
             <a:pPr algn="ctr"/>
             <a:r>
               <a:rPr lang="en-US" dirty="0"/>
-              <a:t>10,000 Meter Percent Change</a:t>
+              <a:t>100 Meter Percent Change</a:t>
             </a:r>
           </a:p>
         </p:txBody>
       </p:sp>
       <p:pic>
         <p:nvPicPr>
-          <p:cNvPr id="10242" name="Picture 2">
+          <p:cNvPr id="6146" name="Picture 2">
             <a:extLst>
               <a:ext uri="{FF2B5EF4-FFF2-40B4-BE49-F238E27FC236}">
-                <a16:creationId xmlns:a16="http://schemas.microsoft.com/office/drawing/2014/main" id="{CDF3652B-FCAA-4905-AA2E-2F37B6EFC01F}"/>
+                <a16:creationId xmlns:a16="http://schemas.microsoft.com/office/drawing/2014/main" id="{0640FBD5-0F66-4FF2-AAFB-2BCA27579134}"/>
               </a:ext>
             </a:extLst>
           </p:cNvPr>
@@ -4563,8 +4573,8 @@
         </p:blipFill>
         <p:spPr bwMode="auto">
           <a:xfrm>
-            <a:off x="1814303" y="884015"/>
-            <a:ext cx="8563393" cy="5792038"/>
+            <a:off x="1909737" y="981226"/>
+            <a:ext cx="8372526" cy="5694827"/>
           </a:xfrm>
           <a:prstGeom prst="rect">
             <a:avLst/>
@@ -4584,7 +4594,7 @@
     </p:spTree>
     <p:extLst>
       <p:ext uri="{BB962C8B-B14F-4D97-AF65-F5344CB8AC3E}">
-        <p14:creationId xmlns:p14="http://schemas.microsoft.com/office/powerpoint/2010/main" val="1303917098"/>
+        <p14:creationId xmlns:p14="http://schemas.microsoft.com/office/powerpoint/2010/main" val="2598118734"/>
       </p:ext>
     </p:extLst>
   </p:cSld>
@@ -4635,48 +4645,79 @@
             <p:ph type="title"/>
           </p:nvPr>
         </p:nvSpPr>
-        <p:spPr/>
-        <p:txBody>
-          <a:bodyPr/>
+        <p:spPr>
+          <a:xfrm>
+            <a:off x="1380931" y="181947"/>
+            <a:ext cx="9601200" cy="667139"/>
+          </a:xfrm>
+        </p:spPr>
+        <p:txBody>
+          <a:bodyPr>
+            <a:normAutofit fontScale="90000"/>
+          </a:bodyPr>
           <a:lstStyle/>
           <a:p>
             <a:pPr algn="ctr"/>
-            <a:endParaRPr lang="en-US" dirty="0"/>
-          </a:p>
-        </p:txBody>
-      </p:sp>
-      <p:sp>
-        <p:nvSpPr>
-          <p:cNvPr id="3" name="Content Placeholder 2">
+            <a:r>
+              <a:rPr lang="en-US" dirty="0"/>
+              <a:t>100M Men’s Physical Stats</a:t>
+            </a:r>
+          </a:p>
+        </p:txBody>
+      </p:sp>
+      <p:pic>
+        <p:nvPicPr>
+          <p:cNvPr id="4098" name="Picture 2">
             <a:extLst>
               <a:ext uri="{FF2B5EF4-FFF2-40B4-BE49-F238E27FC236}">
-                <a16:creationId xmlns:a16="http://schemas.microsoft.com/office/drawing/2014/main" id="{98B21C38-2070-481C-96A3-C4D7B285A65C}"/>
+                <a16:creationId xmlns:a16="http://schemas.microsoft.com/office/drawing/2014/main" id="{624BB8C6-CBEB-449A-AA60-67146ED21EF8}"/>
               </a:ext>
             </a:extLst>
           </p:cNvPr>
-          <p:cNvSpPr>
-            <a:spLocks noGrp="1"/>
-          </p:cNvSpPr>
+          <p:cNvPicPr>
+            <a:picLocks noGrp="1" noChangeAspect="1" noChangeArrowheads="1"/>
+          </p:cNvPicPr>
           <p:nvPr>
             <p:ph idx="1"/>
           </p:nvPr>
-        </p:nvSpPr>
-        <p:spPr/>
-        <p:txBody>
-          <a:bodyPr/>
-          <a:lstStyle/>
-          <a:p>
-            <a:pPr marL="0" indent="0">
-              <a:buNone/>
-            </a:pPr>
-            <a:endParaRPr lang="en-US" dirty="0"/>
-          </a:p>
-        </p:txBody>
-      </p:sp>
+        </p:nvPicPr>
+        <p:blipFill>
+          <a:blip r:embed="rId2">
+            <a:extLst>
+              <a:ext uri="{28A0092B-C50C-407E-A947-70E740481C1C}">
+                <a14:useLocalDpi xmlns:a14="http://schemas.microsoft.com/office/drawing/2010/main" val="0"/>
+              </a:ext>
+            </a:extLst>
+          </a:blip>
+          <a:srcRect/>
+          <a:stretch>
+            <a:fillRect/>
+          </a:stretch>
+        </p:blipFill>
+        <p:spPr bwMode="auto">
+          <a:xfrm>
+            <a:off x="2086185" y="998454"/>
+            <a:ext cx="8179020" cy="5452680"/>
+          </a:xfrm>
+          <a:prstGeom prst="rect">
+            <a:avLst/>
+          </a:prstGeom>
+          <a:noFill/>
+          <a:extLst>
+            <a:ext uri="{909E8E84-426E-40DD-AFC4-6F175D3DCCD1}">
+              <a14:hiddenFill xmlns:a14="http://schemas.microsoft.com/office/drawing/2010/main">
+                <a:solidFill>
+                  <a:srgbClr val="FFFFFF"/>
+                </a:solidFill>
+              </a14:hiddenFill>
+            </a:ext>
+          </a:extLst>
+        </p:spPr>
+      </p:pic>
     </p:spTree>
     <p:extLst>
       <p:ext uri="{BB962C8B-B14F-4D97-AF65-F5344CB8AC3E}">
-        <p14:creationId xmlns:p14="http://schemas.microsoft.com/office/powerpoint/2010/main" val="1646649665"/>
+        <p14:creationId xmlns:p14="http://schemas.microsoft.com/office/powerpoint/2010/main" val="433612582"/>
       </p:ext>
     </p:extLst>
   </p:cSld>
@@ -4727,48 +4768,79 @@
             <p:ph type="title"/>
           </p:nvPr>
         </p:nvSpPr>
-        <p:spPr/>
-        <p:txBody>
-          <a:bodyPr/>
+        <p:spPr>
+          <a:xfrm>
+            <a:off x="1380931" y="181947"/>
+            <a:ext cx="9601200" cy="667139"/>
+          </a:xfrm>
+        </p:spPr>
+        <p:txBody>
+          <a:bodyPr>
+            <a:normAutofit fontScale="90000"/>
+          </a:bodyPr>
           <a:lstStyle/>
           <a:p>
             <a:pPr algn="ctr"/>
-            <a:endParaRPr lang="en-US" dirty="0"/>
-          </a:p>
-        </p:txBody>
-      </p:sp>
-      <p:sp>
-        <p:nvSpPr>
-          <p:cNvPr id="3" name="Content Placeholder 2">
+            <a:r>
+              <a:rPr lang="en-US" dirty="0"/>
+              <a:t>100M Women’s Physical Stats</a:t>
+            </a:r>
+          </a:p>
+        </p:txBody>
+      </p:sp>
+      <p:pic>
+        <p:nvPicPr>
+          <p:cNvPr id="5122" name="Picture 2">
             <a:extLst>
               <a:ext uri="{FF2B5EF4-FFF2-40B4-BE49-F238E27FC236}">
-                <a16:creationId xmlns:a16="http://schemas.microsoft.com/office/drawing/2014/main" id="{98B21C38-2070-481C-96A3-C4D7B285A65C}"/>
+                <a16:creationId xmlns:a16="http://schemas.microsoft.com/office/drawing/2014/main" id="{F05B1A69-96BB-4BE6-AED7-0AEF334376D7}"/>
               </a:ext>
             </a:extLst>
           </p:cNvPr>
-          <p:cNvSpPr>
-            <a:spLocks noGrp="1"/>
-          </p:cNvSpPr>
+          <p:cNvPicPr>
+            <a:picLocks noGrp="1" noChangeAspect="1" noChangeArrowheads="1"/>
+          </p:cNvPicPr>
           <p:nvPr>
             <p:ph idx="1"/>
           </p:nvPr>
-        </p:nvSpPr>
-        <p:spPr/>
-        <p:txBody>
-          <a:bodyPr/>
-          <a:lstStyle/>
-          <a:p>
-            <a:pPr marL="0" indent="0">
-              <a:buNone/>
-            </a:pPr>
-            <a:endParaRPr lang="en-US" dirty="0"/>
-          </a:p>
-        </p:txBody>
-      </p:sp>
+        </p:nvPicPr>
+        <p:blipFill>
+          <a:blip r:embed="rId2">
+            <a:extLst>
+              <a:ext uri="{28A0092B-C50C-407E-A947-70E740481C1C}">
+                <a14:useLocalDpi xmlns:a14="http://schemas.microsoft.com/office/drawing/2010/main" val="0"/>
+              </a:ext>
+            </a:extLst>
+          </a:blip>
+          <a:srcRect/>
+          <a:stretch>
+            <a:fillRect/>
+          </a:stretch>
+        </p:blipFill>
+        <p:spPr bwMode="auto">
+          <a:xfrm>
+            <a:off x="1925136" y="966531"/>
+            <a:ext cx="8341727" cy="5561151"/>
+          </a:xfrm>
+          <a:prstGeom prst="rect">
+            <a:avLst/>
+          </a:prstGeom>
+          <a:noFill/>
+          <a:extLst>
+            <a:ext uri="{909E8E84-426E-40DD-AFC4-6F175D3DCCD1}">
+              <a14:hiddenFill xmlns:a14="http://schemas.microsoft.com/office/drawing/2010/main">
+                <a:solidFill>
+                  <a:srgbClr val="FFFFFF"/>
+                </a:solidFill>
+              </a14:hiddenFill>
+            </a:ext>
+          </a:extLst>
+        </p:spPr>
+      </p:pic>
     </p:spTree>
     <p:extLst>
       <p:ext uri="{BB962C8B-B14F-4D97-AF65-F5344CB8AC3E}">
-        <p14:creationId xmlns:p14="http://schemas.microsoft.com/office/powerpoint/2010/main" val="595075225"/>
+        <p14:creationId xmlns:p14="http://schemas.microsoft.com/office/powerpoint/2010/main" val="2954279583"/>
       </p:ext>
     </p:extLst>
   </p:cSld>
@@ -4819,48 +4891,325 @@
             <p:ph type="title"/>
           </p:nvPr>
         </p:nvSpPr>
-        <p:spPr/>
-        <p:txBody>
-          <a:bodyPr/>
+        <p:spPr>
+          <a:xfrm>
+            <a:off x="1380931" y="181947"/>
+            <a:ext cx="9601200" cy="667139"/>
+          </a:xfrm>
+        </p:spPr>
+        <p:txBody>
+          <a:bodyPr>
+            <a:normAutofit fontScale="90000"/>
+          </a:bodyPr>
           <a:lstStyle/>
           <a:p>
             <a:pPr algn="ctr"/>
-            <a:endParaRPr lang="en-US" dirty="0"/>
-          </a:p>
-        </p:txBody>
-      </p:sp>
-      <p:sp>
-        <p:nvSpPr>
-          <p:cNvPr id="3" name="Content Placeholder 2">
+            <a:r>
+              <a:rPr lang="en-US" dirty="0"/>
+              <a:t>800 Meter Results</a:t>
+            </a:r>
+          </a:p>
+        </p:txBody>
+      </p:sp>
+      <p:pic>
+        <p:nvPicPr>
+          <p:cNvPr id="7170" name="Picture 2">
             <a:extLst>
               <a:ext uri="{FF2B5EF4-FFF2-40B4-BE49-F238E27FC236}">
-                <a16:creationId xmlns:a16="http://schemas.microsoft.com/office/drawing/2014/main" id="{98B21C38-2070-481C-96A3-C4D7B285A65C}"/>
+                <a16:creationId xmlns:a16="http://schemas.microsoft.com/office/drawing/2014/main" id="{AEF8D83D-210A-4B89-989D-8A472D97D1CF}"/>
               </a:ext>
             </a:extLst>
           </p:cNvPr>
-          <p:cNvSpPr>
-            <a:spLocks noGrp="1"/>
-          </p:cNvSpPr>
+          <p:cNvPicPr>
+            <a:picLocks noGrp="1" noChangeAspect="1" noChangeArrowheads="1"/>
+          </p:cNvPicPr>
           <p:nvPr>
             <p:ph idx="1"/>
           </p:nvPr>
-        </p:nvSpPr>
-        <p:spPr/>
-        <p:txBody>
-          <a:bodyPr/>
-          <a:lstStyle/>
-          <a:p>
-            <a:pPr marL="0" indent="0">
-              <a:buNone/>
-            </a:pPr>
-            <a:endParaRPr lang="en-US" dirty="0"/>
-          </a:p>
-        </p:txBody>
-      </p:sp>
+        </p:nvPicPr>
+        <p:blipFill>
+          <a:blip r:embed="rId2">
+            <a:extLst>
+              <a:ext uri="{28A0092B-C50C-407E-A947-70E740481C1C}">
+                <a14:useLocalDpi xmlns:a14="http://schemas.microsoft.com/office/drawing/2010/main" val="0"/>
+              </a:ext>
+            </a:extLst>
+          </a:blip>
+          <a:srcRect/>
+          <a:stretch>
+            <a:fillRect/>
+          </a:stretch>
+        </p:blipFill>
+        <p:spPr bwMode="auto">
+          <a:xfrm>
+            <a:off x="1891038" y="984381"/>
+            <a:ext cx="8409923" cy="5701003"/>
+          </a:xfrm>
+          <a:prstGeom prst="rect">
+            <a:avLst/>
+          </a:prstGeom>
+          <a:noFill/>
+          <a:extLst>
+            <a:ext uri="{909E8E84-426E-40DD-AFC4-6F175D3DCCD1}">
+              <a14:hiddenFill xmlns:a14="http://schemas.microsoft.com/office/drawing/2010/main">
+                <a:solidFill>
+                  <a:srgbClr val="FFFFFF"/>
+                </a:solidFill>
+              </a14:hiddenFill>
+            </a:ext>
+          </a:extLst>
+        </p:spPr>
+      </p:pic>
     </p:spTree>
     <p:extLst>
       <p:ext uri="{BB962C8B-B14F-4D97-AF65-F5344CB8AC3E}">
-        <p14:creationId xmlns:p14="http://schemas.microsoft.com/office/powerpoint/2010/main" val="4169089809"/>
+        <p14:creationId xmlns:p14="http://schemas.microsoft.com/office/powerpoint/2010/main" val="2744490753"/>
+      </p:ext>
+    </p:extLst>
+  </p:cSld>
+  <p:clrMapOvr>
+    <a:masterClrMapping/>
+  </p:clrMapOvr>
+</p:sld>
+</file>
+
+<file path=ppt/slides/slide18.xml><?xml version="1.0" encoding="utf-8"?>
+<p:sld xmlns:a="http://schemas.openxmlformats.org/drawingml/2006/main" xmlns:r="http://schemas.openxmlformats.org/officeDocument/2006/relationships" xmlns:p="http://schemas.openxmlformats.org/presentationml/2006/main">
+  <p:cSld>
+    <p:bg>
+      <p:bgPr>
+        <a:solidFill>
+          <a:schemeClr val="accent4"/>
+        </a:solidFill>
+        <a:effectLst/>
+      </p:bgPr>
+    </p:bg>
+    <p:spTree>
+      <p:nvGrpSpPr>
+        <p:cNvPr id="1" name=""/>
+        <p:cNvGrpSpPr/>
+        <p:nvPr/>
+      </p:nvGrpSpPr>
+      <p:grpSpPr>
+        <a:xfrm>
+          <a:off x="0" y="0"/>
+          <a:ext cx="0" cy="0"/>
+          <a:chOff x="0" y="0"/>
+          <a:chExt cx="0" cy="0"/>
+        </a:xfrm>
+      </p:grpSpPr>
+      <p:sp>
+        <p:nvSpPr>
+          <p:cNvPr id="2" name="Title 1">
+            <a:extLst>
+              <a:ext uri="{FF2B5EF4-FFF2-40B4-BE49-F238E27FC236}">
+                <a16:creationId xmlns:a16="http://schemas.microsoft.com/office/drawing/2014/main" id="{8241CD32-D7BC-4647-A1FB-220F7E681776}"/>
+              </a:ext>
+            </a:extLst>
+          </p:cNvPr>
+          <p:cNvSpPr>
+            <a:spLocks noGrp="1"/>
+          </p:cNvSpPr>
+          <p:nvPr>
+            <p:ph type="title"/>
+          </p:nvPr>
+        </p:nvSpPr>
+        <p:spPr>
+          <a:xfrm>
+            <a:off x="1380931" y="181947"/>
+            <a:ext cx="9601200" cy="667139"/>
+          </a:xfrm>
+        </p:spPr>
+        <p:txBody>
+          <a:bodyPr>
+            <a:normAutofit fontScale="90000"/>
+          </a:bodyPr>
+          <a:lstStyle/>
+          <a:p>
+            <a:pPr algn="ctr"/>
+            <a:r>
+              <a:rPr lang="en-US" dirty="0"/>
+              <a:t>800 Meter Percent Change</a:t>
+            </a:r>
+          </a:p>
+        </p:txBody>
+      </p:sp>
+      <p:pic>
+        <p:nvPicPr>
+          <p:cNvPr id="8194" name="Picture 2">
+            <a:extLst>
+              <a:ext uri="{FF2B5EF4-FFF2-40B4-BE49-F238E27FC236}">
+                <a16:creationId xmlns:a16="http://schemas.microsoft.com/office/drawing/2014/main" id="{95A88D5F-7DF4-4BCC-984E-C8351A1BC93D}"/>
+              </a:ext>
+            </a:extLst>
+          </p:cNvPr>
+          <p:cNvPicPr>
+            <a:picLocks noGrp="1" noChangeAspect="1" noChangeArrowheads="1"/>
+          </p:cNvPicPr>
+          <p:nvPr>
+            <p:ph idx="1"/>
+          </p:nvPr>
+        </p:nvPicPr>
+        <p:blipFill>
+          <a:blip r:embed="rId2">
+            <a:extLst>
+              <a:ext uri="{28A0092B-C50C-407E-A947-70E740481C1C}">
+                <a14:useLocalDpi xmlns:a14="http://schemas.microsoft.com/office/drawing/2010/main" val="0"/>
+              </a:ext>
+            </a:extLst>
+          </a:blip>
+          <a:srcRect/>
+          <a:stretch>
+            <a:fillRect/>
+          </a:stretch>
+        </p:blipFill>
+        <p:spPr bwMode="auto">
+          <a:xfrm>
+            <a:off x="1925535" y="1002718"/>
+            <a:ext cx="8340929" cy="5673335"/>
+          </a:xfrm>
+          <a:prstGeom prst="rect">
+            <a:avLst/>
+          </a:prstGeom>
+          <a:noFill/>
+          <a:extLst>
+            <a:ext uri="{909E8E84-426E-40DD-AFC4-6F175D3DCCD1}">
+              <a14:hiddenFill xmlns:a14="http://schemas.microsoft.com/office/drawing/2010/main">
+                <a:solidFill>
+                  <a:srgbClr val="FFFFFF"/>
+                </a:solidFill>
+              </a14:hiddenFill>
+            </a:ext>
+          </a:extLst>
+        </p:spPr>
+      </p:pic>
+    </p:spTree>
+    <p:extLst>
+      <p:ext uri="{BB962C8B-B14F-4D97-AF65-F5344CB8AC3E}">
+        <p14:creationId xmlns:p14="http://schemas.microsoft.com/office/powerpoint/2010/main" val="1575393097"/>
+      </p:ext>
+    </p:extLst>
+  </p:cSld>
+  <p:clrMapOvr>
+    <a:masterClrMapping/>
+  </p:clrMapOvr>
+</p:sld>
+</file>
+
+<file path=ppt/slides/slide19.xml><?xml version="1.0" encoding="utf-8"?>
+<p:sld xmlns:a="http://schemas.openxmlformats.org/drawingml/2006/main" xmlns:r="http://schemas.openxmlformats.org/officeDocument/2006/relationships" xmlns:p="http://schemas.openxmlformats.org/presentationml/2006/main">
+  <p:cSld>
+    <p:bg>
+      <p:bgPr>
+        <a:solidFill>
+          <a:schemeClr val="accent4"/>
+        </a:solidFill>
+        <a:effectLst/>
+      </p:bgPr>
+    </p:bg>
+    <p:spTree>
+      <p:nvGrpSpPr>
+        <p:cNvPr id="1" name=""/>
+        <p:cNvGrpSpPr/>
+        <p:nvPr/>
+      </p:nvGrpSpPr>
+      <p:grpSpPr>
+        <a:xfrm>
+          <a:off x="0" y="0"/>
+          <a:ext cx="0" cy="0"/>
+          <a:chOff x="0" y="0"/>
+          <a:chExt cx="0" cy="0"/>
+        </a:xfrm>
+      </p:grpSpPr>
+      <p:sp>
+        <p:nvSpPr>
+          <p:cNvPr id="2" name="Title 1">
+            <a:extLst>
+              <a:ext uri="{FF2B5EF4-FFF2-40B4-BE49-F238E27FC236}">
+                <a16:creationId xmlns:a16="http://schemas.microsoft.com/office/drawing/2014/main" id="{8241CD32-D7BC-4647-A1FB-220F7E681776}"/>
+              </a:ext>
+            </a:extLst>
+          </p:cNvPr>
+          <p:cNvSpPr>
+            <a:spLocks noGrp="1"/>
+          </p:cNvSpPr>
+          <p:nvPr>
+            <p:ph type="title"/>
+          </p:nvPr>
+        </p:nvSpPr>
+        <p:spPr>
+          <a:xfrm>
+            <a:off x="1380931" y="181947"/>
+            <a:ext cx="9601200" cy="667139"/>
+          </a:xfrm>
+        </p:spPr>
+        <p:txBody>
+          <a:bodyPr>
+            <a:normAutofit fontScale="90000"/>
+          </a:bodyPr>
+          <a:lstStyle/>
+          <a:p>
+            <a:pPr algn="ctr"/>
+            <a:r>
+              <a:rPr lang="en-US" dirty="0"/>
+              <a:t>800M Men’s Physical Stats</a:t>
+            </a:r>
+          </a:p>
+        </p:txBody>
+      </p:sp>
+      <p:pic>
+        <p:nvPicPr>
+          <p:cNvPr id="6146" name="Picture 2">
+            <a:extLst>
+              <a:ext uri="{FF2B5EF4-FFF2-40B4-BE49-F238E27FC236}">
+                <a16:creationId xmlns:a16="http://schemas.microsoft.com/office/drawing/2014/main" id="{10EB7271-0C58-46E9-A6DA-C9640FAE1112}"/>
+              </a:ext>
+            </a:extLst>
+          </p:cNvPr>
+          <p:cNvPicPr>
+            <a:picLocks noGrp="1" noChangeAspect="1" noChangeArrowheads="1"/>
+          </p:cNvPicPr>
+          <p:nvPr>
+            <p:ph idx="1"/>
+          </p:nvPr>
+        </p:nvPicPr>
+        <p:blipFill>
+          <a:blip r:embed="rId2">
+            <a:extLst>
+              <a:ext uri="{28A0092B-C50C-407E-A947-70E740481C1C}">
+                <a14:useLocalDpi xmlns:a14="http://schemas.microsoft.com/office/drawing/2010/main" val="0"/>
+              </a:ext>
+            </a:extLst>
+          </a:blip>
+          <a:srcRect/>
+          <a:stretch>
+            <a:fillRect/>
+          </a:stretch>
+        </p:blipFill>
+        <p:spPr bwMode="auto">
+          <a:xfrm>
+            <a:off x="2032882" y="1050422"/>
+            <a:ext cx="8126235" cy="5417490"/>
+          </a:xfrm>
+          <a:prstGeom prst="rect">
+            <a:avLst/>
+          </a:prstGeom>
+          <a:noFill/>
+          <a:extLst>
+            <a:ext uri="{909E8E84-426E-40DD-AFC4-6F175D3DCCD1}">
+              <a14:hiddenFill xmlns:a14="http://schemas.microsoft.com/office/drawing/2010/main">
+                <a:solidFill>
+                  <a:srgbClr val="FFFFFF"/>
+                </a:solidFill>
+              </a14:hiddenFill>
+            </a:ext>
+          </a:extLst>
+        </p:spPr>
+      </p:pic>
+    </p:spTree>
+    <p:extLst>
+      <p:ext uri="{BB962C8B-B14F-4D97-AF65-F5344CB8AC3E}">
+        <p14:creationId xmlns:p14="http://schemas.microsoft.com/office/powerpoint/2010/main" val="3331346801"/>
       </p:ext>
     </p:extLst>
   </p:cSld>
@@ -4981,6 +5330,897 @@
     <p:extLst>
       <p:ext uri="{BB962C8B-B14F-4D97-AF65-F5344CB8AC3E}">
         <p14:creationId xmlns:p14="http://schemas.microsoft.com/office/powerpoint/2010/main" val="2555033177"/>
+      </p:ext>
+    </p:extLst>
+  </p:cSld>
+  <p:clrMapOvr>
+    <a:masterClrMapping/>
+  </p:clrMapOvr>
+</p:sld>
+</file>
+
+<file path=ppt/slides/slide20.xml><?xml version="1.0" encoding="utf-8"?>
+<p:sld xmlns:a="http://schemas.openxmlformats.org/drawingml/2006/main" xmlns:r="http://schemas.openxmlformats.org/officeDocument/2006/relationships" xmlns:p="http://schemas.openxmlformats.org/presentationml/2006/main">
+  <p:cSld>
+    <p:bg>
+      <p:bgPr>
+        <a:solidFill>
+          <a:schemeClr val="accent4"/>
+        </a:solidFill>
+        <a:effectLst/>
+      </p:bgPr>
+    </p:bg>
+    <p:spTree>
+      <p:nvGrpSpPr>
+        <p:cNvPr id="1" name=""/>
+        <p:cNvGrpSpPr/>
+        <p:nvPr/>
+      </p:nvGrpSpPr>
+      <p:grpSpPr>
+        <a:xfrm>
+          <a:off x="0" y="0"/>
+          <a:ext cx="0" cy="0"/>
+          <a:chOff x="0" y="0"/>
+          <a:chExt cx="0" cy="0"/>
+        </a:xfrm>
+      </p:grpSpPr>
+      <p:sp>
+        <p:nvSpPr>
+          <p:cNvPr id="2" name="Title 1">
+            <a:extLst>
+              <a:ext uri="{FF2B5EF4-FFF2-40B4-BE49-F238E27FC236}">
+                <a16:creationId xmlns:a16="http://schemas.microsoft.com/office/drawing/2014/main" id="{8241CD32-D7BC-4647-A1FB-220F7E681776}"/>
+              </a:ext>
+            </a:extLst>
+          </p:cNvPr>
+          <p:cNvSpPr>
+            <a:spLocks noGrp="1"/>
+          </p:cNvSpPr>
+          <p:nvPr>
+            <p:ph type="title"/>
+          </p:nvPr>
+        </p:nvSpPr>
+        <p:spPr>
+          <a:xfrm>
+            <a:off x="1380931" y="181947"/>
+            <a:ext cx="9601200" cy="667139"/>
+          </a:xfrm>
+        </p:spPr>
+        <p:txBody>
+          <a:bodyPr>
+            <a:normAutofit fontScale="90000"/>
+          </a:bodyPr>
+          <a:lstStyle/>
+          <a:p>
+            <a:pPr algn="ctr"/>
+            <a:r>
+              <a:rPr lang="en-US" dirty="0"/>
+              <a:t>800M Women’s Physical Stats</a:t>
+            </a:r>
+          </a:p>
+        </p:txBody>
+      </p:sp>
+      <p:pic>
+        <p:nvPicPr>
+          <p:cNvPr id="7170" name="Picture 2">
+            <a:extLst>
+              <a:ext uri="{FF2B5EF4-FFF2-40B4-BE49-F238E27FC236}">
+                <a16:creationId xmlns:a16="http://schemas.microsoft.com/office/drawing/2014/main" id="{95CA3B1E-48DD-48B9-BC19-1EA0932FA6AF}"/>
+              </a:ext>
+            </a:extLst>
+          </p:cNvPr>
+          <p:cNvPicPr>
+            <a:picLocks noGrp="1" noChangeAspect="1" noChangeArrowheads="1"/>
+          </p:cNvPicPr>
+          <p:nvPr>
+            <p:ph idx="1"/>
+          </p:nvPr>
+        </p:nvPicPr>
+        <p:blipFill>
+          <a:blip r:embed="rId2">
+            <a:extLst>
+              <a:ext uri="{28A0092B-C50C-407E-A947-70E740481C1C}">
+                <a14:useLocalDpi xmlns:a14="http://schemas.microsoft.com/office/drawing/2010/main" val="0"/>
+              </a:ext>
+            </a:extLst>
+          </a:blip>
+          <a:srcRect/>
+          <a:stretch>
+            <a:fillRect/>
+          </a:stretch>
+        </p:blipFill>
+        <p:spPr bwMode="auto">
+          <a:xfrm>
+            <a:off x="2023946" y="966411"/>
+            <a:ext cx="8315170" cy="5543446"/>
+          </a:xfrm>
+          <a:prstGeom prst="rect">
+            <a:avLst/>
+          </a:prstGeom>
+          <a:noFill/>
+          <a:extLst>
+            <a:ext uri="{909E8E84-426E-40DD-AFC4-6F175D3DCCD1}">
+              <a14:hiddenFill xmlns:a14="http://schemas.microsoft.com/office/drawing/2010/main">
+                <a:solidFill>
+                  <a:srgbClr val="FFFFFF"/>
+                </a:solidFill>
+              </a14:hiddenFill>
+            </a:ext>
+          </a:extLst>
+        </p:spPr>
+      </p:pic>
+    </p:spTree>
+    <p:extLst>
+      <p:ext uri="{BB962C8B-B14F-4D97-AF65-F5344CB8AC3E}">
+        <p14:creationId xmlns:p14="http://schemas.microsoft.com/office/powerpoint/2010/main" val="183123892"/>
+      </p:ext>
+    </p:extLst>
+  </p:cSld>
+  <p:clrMapOvr>
+    <a:masterClrMapping/>
+  </p:clrMapOvr>
+</p:sld>
+</file>
+
+<file path=ppt/slides/slide21.xml><?xml version="1.0" encoding="utf-8"?>
+<p:sld xmlns:a="http://schemas.openxmlformats.org/drawingml/2006/main" xmlns:r="http://schemas.openxmlformats.org/officeDocument/2006/relationships" xmlns:p="http://schemas.openxmlformats.org/presentationml/2006/main">
+  <p:cSld>
+    <p:bg>
+      <p:bgPr>
+        <a:solidFill>
+          <a:schemeClr val="accent4"/>
+        </a:solidFill>
+        <a:effectLst/>
+      </p:bgPr>
+    </p:bg>
+    <p:spTree>
+      <p:nvGrpSpPr>
+        <p:cNvPr id="1" name=""/>
+        <p:cNvGrpSpPr/>
+        <p:nvPr/>
+      </p:nvGrpSpPr>
+      <p:grpSpPr>
+        <a:xfrm>
+          <a:off x="0" y="0"/>
+          <a:ext cx="0" cy="0"/>
+          <a:chOff x="0" y="0"/>
+          <a:chExt cx="0" cy="0"/>
+        </a:xfrm>
+      </p:grpSpPr>
+      <p:sp>
+        <p:nvSpPr>
+          <p:cNvPr id="2" name="Title 1">
+            <a:extLst>
+              <a:ext uri="{FF2B5EF4-FFF2-40B4-BE49-F238E27FC236}">
+                <a16:creationId xmlns:a16="http://schemas.microsoft.com/office/drawing/2014/main" id="{8241CD32-D7BC-4647-A1FB-220F7E681776}"/>
+              </a:ext>
+            </a:extLst>
+          </p:cNvPr>
+          <p:cNvSpPr>
+            <a:spLocks noGrp="1"/>
+          </p:cNvSpPr>
+          <p:nvPr>
+            <p:ph type="title"/>
+          </p:nvPr>
+        </p:nvSpPr>
+        <p:spPr>
+          <a:xfrm>
+            <a:off x="1380931" y="181947"/>
+            <a:ext cx="9601200" cy="665341"/>
+          </a:xfrm>
+        </p:spPr>
+        <p:txBody>
+          <a:bodyPr>
+            <a:normAutofit fontScale="90000"/>
+          </a:bodyPr>
+          <a:lstStyle/>
+          <a:p>
+            <a:pPr algn="ctr"/>
+            <a:r>
+              <a:rPr lang="en-US" dirty="0"/>
+              <a:t>10,000 Meter Results</a:t>
+            </a:r>
+          </a:p>
+        </p:txBody>
+      </p:sp>
+      <p:pic>
+        <p:nvPicPr>
+          <p:cNvPr id="9218" name="Picture 2">
+            <a:extLst>
+              <a:ext uri="{FF2B5EF4-FFF2-40B4-BE49-F238E27FC236}">
+                <a16:creationId xmlns:a16="http://schemas.microsoft.com/office/drawing/2014/main" id="{7925DD9A-46C0-49C1-9B62-C83CB20ADA4E}"/>
+              </a:ext>
+            </a:extLst>
+          </p:cNvPr>
+          <p:cNvPicPr>
+            <a:picLocks noGrp="1" noChangeAspect="1" noChangeArrowheads="1"/>
+          </p:cNvPicPr>
+          <p:nvPr>
+            <p:ph idx="1"/>
+          </p:nvPr>
+        </p:nvPicPr>
+        <p:blipFill>
+          <a:blip r:embed="rId2">
+            <a:extLst>
+              <a:ext uri="{28A0092B-C50C-407E-A947-70E740481C1C}">
+                <a14:useLocalDpi xmlns:a14="http://schemas.microsoft.com/office/drawing/2010/main" val="0"/>
+              </a:ext>
+            </a:extLst>
+          </a:blip>
+          <a:srcRect/>
+          <a:stretch>
+            <a:fillRect/>
+          </a:stretch>
+        </p:blipFill>
+        <p:spPr bwMode="auto">
+          <a:xfrm>
+            <a:off x="1786993" y="847288"/>
+            <a:ext cx="8618014" cy="5855209"/>
+          </a:xfrm>
+          <a:prstGeom prst="rect">
+            <a:avLst/>
+          </a:prstGeom>
+          <a:noFill/>
+          <a:extLst>
+            <a:ext uri="{909E8E84-426E-40DD-AFC4-6F175D3DCCD1}">
+              <a14:hiddenFill xmlns:a14="http://schemas.microsoft.com/office/drawing/2010/main">
+                <a:solidFill>
+                  <a:srgbClr val="FFFFFF"/>
+                </a:solidFill>
+              </a14:hiddenFill>
+            </a:ext>
+          </a:extLst>
+        </p:spPr>
+      </p:pic>
+    </p:spTree>
+    <p:extLst>
+      <p:ext uri="{BB962C8B-B14F-4D97-AF65-F5344CB8AC3E}">
+        <p14:creationId xmlns:p14="http://schemas.microsoft.com/office/powerpoint/2010/main" val="98386956"/>
+      </p:ext>
+    </p:extLst>
+  </p:cSld>
+  <p:clrMapOvr>
+    <a:masterClrMapping/>
+  </p:clrMapOvr>
+</p:sld>
+</file>
+
+<file path=ppt/slides/slide22.xml><?xml version="1.0" encoding="utf-8"?>
+<p:sld xmlns:a="http://schemas.openxmlformats.org/drawingml/2006/main" xmlns:r="http://schemas.openxmlformats.org/officeDocument/2006/relationships" xmlns:p="http://schemas.openxmlformats.org/presentationml/2006/main">
+  <p:cSld>
+    <p:bg>
+      <p:bgPr>
+        <a:solidFill>
+          <a:schemeClr val="accent4"/>
+        </a:solidFill>
+        <a:effectLst/>
+      </p:bgPr>
+    </p:bg>
+    <p:spTree>
+      <p:nvGrpSpPr>
+        <p:cNvPr id="1" name=""/>
+        <p:cNvGrpSpPr/>
+        <p:nvPr/>
+      </p:nvGrpSpPr>
+      <p:grpSpPr>
+        <a:xfrm>
+          <a:off x="0" y="0"/>
+          <a:ext cx="0" cy="0"/>
+          <a:chOff x="0" y="0"/>
+          <a:chExt cx="0" cy="0"/>
+        </a:xfrm>
+      </p:grpSpPr>
+      <p:sp>
+        <p:nvSpPr>
+          <p:cNvPr id="2" name="Title 1">
+            <a:extLst>
+              <a:ext uri="{FF2B5EF4-FFF2-40B4-BE49-F238E27FC236}">
+                <a16:creationId xmlns:a16="http://schemas.microsoft.com/office/drawing/2014/main" id="{8241CD32-D7BC-4647-A1FB-220F7E681776}"/>
+              </a:ext>
+            </a:extLst>
+          </p:cNvPr>
+          <p:cNvSpPr>
+            <a:spLocks noGrp="1"/>
+          </p:cNvSpPr>
+          <p:nvPr>
+            <p:ph type="title"/>
+          </p:nvPr>
+        </p:nvSpPr>
+        <p:spPr>
+          <a:xfrm>
+            <a:off x="1380931" y="181947"/>
+            <a:ext cx="9601200" cy="665341"/>
+          </a:xfrm>
+        </p:spPr>
+        <p:txBody>
+          <a:bodyPr>
+            <a:normAutofit fontScale="90000"/>
+          </a:bodyPr>
+          <a:lstStyle/>
+          <a:p>
+            <a:pPr algn="ctr"/>
+            <a:r>
+              <a:rPr lang="en-US" dirty="0"/>
+              <a:t>10,000 Meter Percent Change</a:t>
+            </a:r>
+          </a:p>
+        </p:txBody>
+      </p:sp>
+      <p:pic>
+        <p:nvPicPr>
+          <p:cNvPr id="10242" name="Picture 2">
+            <a:extLst>
+              <a:ext uri="{FF2B5EF4-FFF2-40B4-BE49-F238E27FC236}">
+                <a16:creationId xmlns:a16="http://schemas.microsoft.com/office/drawing/2014/main" id="{CDF3652B-FCAA-4905-AA2E-2F37B6EFC01F}"/>
+              </a:ext>
+            </a:extLst>
+          </p:cNvPr>
+          <p:cNvPicPr>
+            <a:picLocks noGrp="1" noChangeAspect="1" noChangeArrowheads="1"/>
+          </p:cNvPicPr>
+          <p:nvPr>
+            <p:ph idx="1"/>
+          </p:nvPr>
+        </p:nvPicPr>
+        <p:blipFill>
+          <a:blip r:embed="rId2">
+            <a:extLst>
+              <a:ext uri="{28A0092B-C50C-407E-A947-70E740481C1C}">
+                <a14:useLocalDpi xmlns:a14="http://schemas.microsoft.com/office/drawing/2010/main" val="0"/>
+              </a:ext>
+            </a:extLst>
+          </a:blip>
+          <a:srcRect/>
+          <a:stretch>
+            <a:fillRect/>
+          </a:stretch>
+        </p:blipFill>
+        <p:spPr bwMode="auto">
+          <a:xfrm>
+            <a:off x="1814303" y="884015"/>
+            <a:ext cx="8563393" cy="5792038"/>
+          </a:xfrm>
+          <a:prstGeom prst="rect">
+            <a:avLst/>
+          </a:prstGeom>
+          <a:noFill/>
+          <a:extLst>
+            <a:ext uri="{909E8E84-426E-40DD-AFC4-6F175D3DCCD1}">
+              <a14:hiddenFill xmlns:a14="http://schemas.microsoft.com/office/drawing/2010/main">
+                <a:solidFill>
+                  <a:srgbClr val="FFFFFF"/>
+                </a:solidFill>
+              </a14:hiddenFill>
+            </a:ext>
+          </a:extLst>
+        </p:spPr>
+      </p:pic>
+    </p:spTree>
+    <p:extLst>
+      <p:ext uri="{BB962C8B-B14F-4D97-AF65-F5344CB8AC3E}">
+        <p14:creationId xmlns:p14="http://schemas.microsoft.com/office/powerpoint/2010/main" val="1303917098"/>
+      </p:ext>
+    </p:extLst>
+  </p:cSld>
+  <p:clrMapOvr>
+    <a:masterClrMapping/>
+  </p:clrMapOvr>
+</p:sld>
+</file>
+
+<file path=ppt/slides/slide23.xml><?xml version="1.0" encoding="utf-8"?>
+<p:sld xmlns:a="http://schemas.openxmlformats.org/drawingml/2006/main" xmlns:r="http://schemas.openxmlformats.org/officeDocument/2006/relationships" xmlns:p="http://schemas.openxmlformats.org/presentationml/2006/main">
+  <p:cSld>
+    <p:bg>
+      <p:bgPr>
+        <a:solidFill>
+          <a:schemeClr val="accent4"/>
+        </a:solidFill>
+        <a:effectLst/>
+      </p:bgPr>
+    </p:bg>
+    <p:spTree>
+      <p:nvGrpSpPr>
+        <p:cNvPr id="1" name=""/>
+        <p:cNvGrpSpPr/>
+        <p:nvPr/>
+      </p:nvGrpSpPr>
+      <p:grpSpPr>
+        <a:xfrm>
+          <a:off x="0" y="0"/>
+          <a:ext cx="0" cy="0"/>
+          <a:chOff x="0" y="0"/>
+          <a:chExt cx="0" cy="0"/>
+        </a:xfrm>
+      </p:grpSpPr>
+      <p:sp>
+        <p:nvSpPr>
+          <p:cNvPr id="2" name="Title 1">
+            <a:extLst>
+              <a:ext uri="{FF2B5EF4-FFF2-40B4-BE49-F238E27FC236}">
+                <a16:creationId xmlns:a16="http://schemas.microsoft.com/office/drawing/2014/main" id="{8241CD32-D7BC-4647-A1FB-220F7E681776}"/>
+              </a:ext>
+            </a:extLst>
+          </p:cNvPr>
+          <p:cNvSpPr>
+            <a:spLocks noGrp="1"/>
+          </p:cNvSpPr>
+          <p:nvPr>
+            <p:ph type="title"/>
+          </p:nvPr>
+        </p:nvSpPr>
+        <p:spPr>
+          <a:xfrm>
+            <a:off x="1380931" y="181947"/>
+            <a:ext cx="9601200" cy="667139"/>
+          </a:xfrm>
+        </p:spPr>
+        <p:txBody>
+          <a:bodyPr>
+            <a:normAutofit fontScale="90000"/>
+          </a:bodyPr>
+          <a:lstStyle/>
+          <a:p>
+            <a:pPr algn="ctr"/>
+            <a:r>
+              <a:rPr lang="en-US" dirty="0"/>
+              <a:t>10,000M Men’s Physical Stats</a:t>
+            </a:r>
+          </a:p>
+        </p:txBody>
+      </p:sp>
+      <p:pic>
+        <p:nvPicPr>
+          <p:cNvPr id="8194" name="Picture 2">
+            <a:extLst>
+              <a:ext uri="{FF2B5EF4-FFF2-40B4-BE49-F238E27FC236}">
+                <a16:creationId xmlns:a16="http://schemas.microsoft.com/office/drawing/2014/main" id="{09EDE7B0-B9D7-488A-A05D-01F4A46D3747}"/>
+              </a:ext>
+            </a:extLst>
+          </p:cNvPr>
+          <p:cNvPicPr>
+            <a:picLocks noGrp="1" noChangeAspect="1" noChangeArrowheads="1"/>
+          </p:cNvPicPr>
+          <p:nvPr>
+            <p:ph idx="1"/>
+          </p:nvPr>
+        </p:nvPicPr>
+        <p:blipFill>
+          <a:blip r:embed="rId2">
+            <a:extLst>
+              <a:ext uri="{28A0092B-C50C-407E-A947-70E740481C1C}">
+                <a14:useLocalDpi xmlns:a14="http://schemas.microsoft.com/office/drawing/2010/main" val="0"/>
+              </a:ext>
+            </a:extLst>
+          </a:blip>
+          <a:srcRect/>
+          <a:stretch>
+            <a:fillRect/>
+          </a:stretch>
+        </p:blipFill>
+        <p:spPr bwMode="auto">
+          <a:xfrm>
+            <a:off x="2039898" y="974921"/>
+            <a:ext cx="8112203" cy="5408135"/>
+          </a:xfrm>
+          <a:prstGeom prst="rect">
+            <a:avLst/>
+          </a:prstGeom>
+          <a:noFill/>
+          <a:extLst>
+            <a:ext uri="{909E8E84-426E-40DD-AFC4-6F175D3DCCD1}">
+              <a14:hiddenFill xmlns:a14="http://schemas.microsoft.com/office/drawing/2010/main">
+                <a:solidFill>
+                  <a:srgbClr val="FFFFFF"/>
+                </a:solidFill>
+              </a14:hiddenFill>
+            </a:ext>
+          </a:extLst>
+        </p:spPr>
+      </p:pic>
+    </p:spTree>
+    <p:extLst>
+      <p:ext uri="{BB962C8B-B14F-4D97-AF65-F5344CB8AC3E}">
+        <p14:creationId xmlns:p14="http://schemas.microsoft.com/office/powerpoint/2010/main" val="2203341752"/>
+      </p:ext>
+    </p:extLst>
+  </p:cSld>
+  <p:clrMapOvr>
+    <a:masterClrMapping/>
+  </p:clrMapOvr>
+</p:sld>
+</file>
+
+<file path=ppt/slides/slide24.xml><?xml version="1.0" encoding="utf-8"?>
+<p:sld xmlns:a="http://schemas.openxmlformats.org/drawingml/2006/main" xmlns:r="http://schemas.openxmlformats.org/officeDocument/2006/relationships" xmlns:p="http://schemas.openxmlformats.org/presentationml/2006/main">
+  <p:cSld>
+    <p:bg>
+      <p:bgPr>
+        <a:solidFill>
+          <a:schemeClr val="accent4"/>
+        </a:solidFill>
+        <a:effectLst/>
+      </p:bgPr>
+    </p:bg>
+    <p:spTree>
+      <p:nvGrpSpPr>
+        <p:cNvPr id="1" name=""/>
+        <p:cNvGrpSpPr/>
+        <p:nvPr/>
+      </p:nvGrpSpPr>
+      <p:grpSpPr>
+        <a:xfrm>
+          <a:off x="0" y="0"/>
+          <a:ext cx="0" cy="0"/>
+          <a:chOff x="0" y="0"/>
+          <a:chExt cx="0" cy="0"/>
+        </a:xfrm>
+      </p:grpSpPr>
+      <p:sp>
+        <p:nvSpPr>
+          <p:cNvPr id="2" name="Title 1">
+            <a:extLst>
+              <a:ext uri="{FF2B5EF4-FFF2-40B4-BE49-F238E27FC236}">
+                <a16:creationId xmlns:a16="http://schemas.microsoft.com/office/drawing/2014/main" id="{8241CD32-D7BC-4647-A1FB-220F7E681776}"/>
+              </a:ext>
+            </a:extLst>
+          </p:cNvPr>
+          <p:cNvSpPr>
+            <a:spLocks noGrp="1"/>
+          </p:cNvSpPr>
+          <p:nvPr>
+            <p:ph type="title"/>
+          </p:nvPr>
+        </p:nvSpPr>
+        <p:spPr>
+          <a:xfrm>
+            <a:off x="1380931" y="181947"/>
+            <a:ext cx="9601200" cy="667139"/>
+          </a:xfrm>
+        </p:spPr>
+        <p:txBody>
+          <a:bodyPr>
+            <a:normAutofit fontScale="90000"/>
+          </a:bodyPr>
+          <a:lstStyle/>
+          <a:p>
+            <a:pPr algn="ctr"/>
+            <a:r>
+              <a:rPr lang="en-US" dirty="0"/>
+              <a:t>10,000M Women’s Physical Stats</a:t>
+            </a:r>
+          </a:p>
+        </p:txBody>
+      </p:sp>
+      <p:pic>
+        <p:nvPicPr>
+          <p:cNvPr id="9218" name="Picture 2">
+            <a:extLst>
+              <a:ext uri="{FF2B5EF4-FFF2-40B4-BE49-F238E27FC236}">
+                <a16:creationId xmlns:a16="http://schemas.microsoft.com/office/drawing/2014/main" id="{41EFB545-25F1-463E-AAE1-7E505AA34570}"/>
+              </a:ext>
+            </a:extLst>
+          </p:cNvPr>
+          <p:cNvPicPr>
+            <a:picLocks noGrp="1" noChangeAspect="1" noChangeArrowheads="1"/>
+          </p:cNvPicPr>
+          <p:nvPr>
+            <p:ph idx="1"/>
+          </p:nvPr>
+        </p:nvPicPr>
+        <p:blipFill>
+          <a:blip r:embed="rId2">
+            <a:extLst>
+              <a:ext uri="{28A0092B-C50C-407E-A947-70E740481C1C}">
+                <a14:useLocalDpi xmlns:a14="http://schemas.microsoft.com/office/drawing/2010/main" val="0"/>
+              </a:ext>
+            </a:extLst>
+          </a:blip>
+          <a:srcRect/>
+          <a:stretch>
+            <a:fillRect/>
+          </a:stretch>
+        </p:blipFill>
+        <p:spPr bwMode="auto">
+          <a:xfrm>
+            <a:off x="2071852" y="974800"/>
+            <a:ext cx="8048295" cy="5365530"/>
+          </a:xfrm>
+          <a:prstGeom prst="rect">
+            <a:avLst/>
+          </a:prstGeom>
+          <a:noFill/>
+          <a:extLst>
+            <a:ext uri="{909E8E84-426E-40DD-AFC4-6F175D3DCCD1}">
+              <a14:hiddenFill xmlns:a14="http://schemas.microsoft.com/office/drawing/2010/main">
+                <a:solidFill>
+                  <a:srgbClr val="FFFFFF"/>
+                </a:solidFill>
+              </a14:hiddenFill>
+            </a:ext>
+          </a:extLst>
+        </p:spPr>
+      </p:pic>
+    </p:spTree>
+    <p:extLst>
+      <p:ext uri="{BB962C8B-B14F-4D97-AF65-F5344CB8AC3E}">
+        <p14:creationId xmlns:p14="http://schemas.microsoft.com/office/powerpoint/2010/main" val="4210258223"/>
+      </p:ext>
+    </p:extLst>
+  </p:cSld>
+  <p:clrMapOvr>
+    <a:masterClrMapping/>
+  </p:clrMapOvr>
+</p:sld>
+</file>
+
+<file path=ppt/slides/slide25.xml><?xml version="1.0" encoding="utf-8"?>
+<p:sld xmlns:a="http://schemas.openxmlformats.org/drawingml/2006/main" xmlns:r="http://schemas.openxmlformats.org/officeDocument/2006/relationships" xmlns:p="http://schemas.openxmlformats.org/presentationml/2006/main">
+  <p:cSld>
+    <p:bg>
+      <p:bgPr>
+        <a:solidFill>
+          <a:schemeClr val="accent4"/>
+        </a:solidFill>
+        <a:effectLst/>
+      </p:bgPr>
+    </p:bg>
+    <p:spTree>
+      <p:nvGrpSpPr>
+        <p:cNvPr id="1" name=""/>
+        <p:cNvGrpSpPr/>
+        <p:nvPr/>
+      </p:nvGrpSpPr>
+      <p:grpSpPr>
+        <a:xfrm>
+          <a:off x="0" y="0"/>
+          <a:ext cx="0" cy="0"/>
+          <a:chOff x="0" y="0"/>
+          <a:chExt cx="0" cy="0"/>
+        </a:xfrm>
+      </p:grpSpPr>
+      <p:sp>
+        <p:nvSpPr>
+          <p:cNvPr id="2" name="Title 1">
+            <a:extLst>
+              <a:ext uri="{FF2B5EF4-FFF2-40B4-BE49-F238E27FC236}">
+                <a16:creationId xmlns:a16="http://schemas.microsoft.com/office/drawing/2014/main" id="{8241CD32-D7BC-4647-A1FB-220F7E681776}"/>
+              </a:ext>
+            </a:extLst>
+          </p:cNvPr>
+          <p:cNvSpPr>
+            <a:spLocks noGrp="1"/>
+          </p:cNvSpPr>
+          <p:nvPr>
+            <p:ph type="title"/>
+          </p:nvPr>
+        </p:nvSpPr>
+        <p:spPr/>
+        <p:txBody>
+          <a:bodyPr/>
+          <a:lstStyle/>
+          <a:p>
+            <a:pPr algn="ctr"/>
+            <a:endParaRPr lang="en-US" dirty="0"/>
+          </a:p>
+        </p:txBody>
+      </p:sp>
+      <p:sp>
+        <p:nvSpPr>
+          <p:cNvPr id="3" name="Content Placeholder 2">
+            <a:extLst>
+              <a:ext uri="{FF2B5EF4-FFF2-40B4-BE49-F238E27FC236}">
+                <a16:creationId xmlns:a16="http://schemas.microsoft.com/office/drawing/2014/main" id="{98B21C38-2070-481C-96A3-C4D7B285A65C}"/>
+              </a:ext>
+            </a:extLst>
+          </p:cNvPr>
+          <p:cNvSpPr>
+            <a:spLocks noGrp="1"/>
+          </p:cNvSpPr>
+          <p:nvPr>
+            <p:ph idx="1"/>
+          </p:nvPr>
+        </p:nvSpPr>
+        <p:spPr/>
+        <p:txBody>
+          <a:bodyPr/>
+          <a:lstStyle/>
+          <a:p>
+            <a:pPr marL="0" indent="0">
+              <a:buNone/>
+            </a:pPr>
+            <a:endParaRPr lang="en-US" dirty="0"/>
+          </a:p>
+        </p:txBody>
+      </p:sp>
+    </p:spTree>
+    <p:extLst>
+      <p:ext uri="{BB962C8B-B14F-4D97-AF65-F5344CB8AC3E}">
+        <p14:creationId xmlns:p14="http://schemas.microsoft.com/office/powerpoint/2010/main" val="1646649665"/>
+      </p:ext>
+    </p:extLst>
+  </p:cSld>
+  <p:clrMapOvr>
+    <a:masterClrMapping/>
+  </p:clrMapOvr>
+</p:sld>
+</file>
+
+<file path=ppt/slides/slide26.xml><?xml version="1.0" encoding="utf-8"?>
+<p:sld xmlns:a="http://schemas.openxmlformats.org/drawingml/2006/main" xmlns:r="http://schemas.openxmlformats.org/officeDocument/2006/relationships" xmlns:p="http://schemas.openxmlformats.org/presentationml/2006/main">
+  <p:cSld>
+    <p:bg>
+      <p:bgPr>
+        <a:solidFill>
+          <a:schemeClr val="accent4"/>
+        </a:solidFill>
+        <a:effectLst/>
+      </p:bgPr>
+    </p:bg>
+    <p:spTree>
+      <p:nvGrpSpPr>
+        <p:cNvPr id="1" name=""/>
+        <p:cNvGrpSpPr/>
+        <p:nvPr/>
+      </p:nvGrpSpPr>
+      <p:grpSpPr>
+        <a:xfrm>
+          <a:off x="0" y="0"/>
+          <a:ext cx="0" cy="0"/>
+          <a:chOff x="0" y="0"/>
+          <a:chExt cx="0" cy="0"/>
+        </a:xfrm>
+      </p:grpSpPr>
+      <p:sp>
+        <p:nvSpPr>
+          <p:cNvPr id="2" name="Title 1">
+            <a:extLst>
+              <a:ext uri="{FF2B5EF4-FFF2-40B4-BE49-F238E27FC236}">
+                <a16:creationId xmlns:a16="http://schemas.microsoft.com/office/drawing/2014/main" id="{8241CD32-D7BC-4647-A1FB-220F7E681776}"/>
+              </a:ext>
+            </a:extLst>
+          </p:cNvPr>
+          <p:cNvSpPr>
+            <a:spLocks noGrp="1"/>
+          </p:cNvSpPr>
+          <p:nvPr>
+            <p:ph type="title"/>
+          </p:nvPr>
+        </p:nvSpPr>
+        <p:spPr/>
+        <p:txBody>
+          <a:bodyPr/>
+          <a:lstStyle/>
+          <a:p>
+            <a:pPr algn="ctr"/>
+            <a:endParaRPr lang="en-US" dirty="0"/>
+          </a:p>
+        </p:txBody>
+      </p:sp>
+      <p:sp>
+        <p:nvSpPr>
+          <p:cNvPr id="3" name="Content Placeholder 2">
+            <a:extLst>
+              <a:ext uri="{FF2B5EF4-FFF2-40B4-BE49-F238E27FC236}">
+                <a16:creationId xmlns:a16="http://schemas.microsoft.com/office/drawing/2014/main" id="{98B21C38-2070-481C-96A3-C4D7B285A65C}"/>
+              </a:ext>
+            </a:extLst>
+          </p:cNvPr>
+          <p:cNvSpPr>
+            <a:spLocks noGrp="1"/>
+          </p:cNvSpPr>
+          <p:nvPr>
+            <p:ph idx="1"/>
+          </p:nvPr>
+        </p:nvSpPr>
+        <p:spPr/>
+        <p:txBody>
+          <a:bodyPr/>
+          <a:lstStyle/>
+          <a:p>
+            <a:pPr marL="0" indent="0">
+              <a:buNone/>
+            </a:pPr>
+            <a:endParaRPr lang="en-US" dirty="0"/>
+          </a:p>
+        </p:txBody>
+      </p:sp>
+    </p:spTree>
+    <p:extLst>
+      <p:ext uri="{BB962C8B-B14F-4D97-AF65-F5344CB8AC3E}">
+        <p14:creationId xmlns:p14="http://schemas.microsoft.com/office/powerpoint/2010/main" val="595075225"/>
+      </p:ext>
+    </p:extLst>
+  </p:cSld>
+  <p:clrMapOvr>
+    <a:masterClrMapping/>
+  </p:clrMapOvr>
+</p:sld>
+</file>
+
+<file path=ppt/slides/slide27.xml><?xml version="1.0" encoding="utf-8"?>
+<p:sld xmlns:a="http://schemas.openxmlformats.org/drawingml/2006/main" xmlns:r="http://schemas.openxmlformats.org/officeDocument/2006/relationships" xmlns:p="http://schemas.openxmlformats.org/presentationml/2006/main">
+  <p:cSld>
+    <p:bg>
+      <p:bgPr>
+        <a:solidFill>
+          <a:schemeClr val="accent4"/>
+        </a:solidFill>
+        <a:effectLst/>
+      </p:bgPr>
+    </p:bg>
+    <p:spTree>
+      <p:nvGrpSpPr>
+        <p:cNvPr id="1" name=""/>
+        <p:cNvGrpSpPr/>
+        <p:nvPr/>
+      </p:nvGrpSpPr>
+      <p:grpSpPr>
+        <a:xfrm>
+          <a:off x="0" y="0"/>
+          <a:ext cx="0" cy="0"/>
+          <a:chOff x="0" y="0"/>
+          <a:chExt cx="0" cy="0"/>
+        </a:xfrm>
+      </p:grpSpPr>
+      <p:sp>
+        <p:nvSpPr>
+          <p:cNvPr id="2" name="Title 1">
+            <a:extLst>
+              <a:ext uri="{FF2B5EF4-FFF2-40B4-BE49-F238E27FC236}">
+                <a16:creationId xmlns:a16="http://schemas.microsoft.com/office/drawing/2014/main" id="{8241CD32-D7BC-4647-A1FB-220F7E681776}"/>
+              </a:ext>
+            </a:extLst>
+          </p:cNvPr>
+          <p:cNvSpPr>
+            <a:spLocks noGrp="1"/>
+          </p:cNvSpPr>
+          <p:nvPr>
+            <p:ph type="title"/>
+          </p:nvPr>
+        </p:nvSpPr>
+        <p:spPr/>
+        <p:txBody>
+          <a:bodyPr/>
+          <a:lstStyle/>
+          <a:p>
+            <a:pPr algn="ctr"/>
+            <a:endParaRPr lang="en-US" dirty="0"/>
+          </a:p>
+        </p:txBody>
+      </p:sp>
+      <p:sp>
+        <p:nvSpPr>
+          <p:cNvPr id="3" name="Content Placeholder 2">
+            <a:extLst>
+              <a:ext uri="{FF2B5EF4-FFF2-40B4-BE49-F238E27FC236}">
+                <a16:creationId xmlns:a16="http://schemas.microsoft.com/office/drawing/2014/main" id="{98B21C38-2070-481C-96A3-C4D7B285A65C}"/>
+              </a:ext>
+            </a:extLst>
+          </p:cNvPr>
+          <p:cNvSpPr>
+            <a:spLocks noGrp="1"/>
+          </p:cNvSpPr>
+          <p:nvPr>
+            <p:ph idx="1"/>
+          </p:nvPr>
+        </p:nvSpPr>
+        <p:spPr/>
+        <p:txBody>
+          <a:bodyPr/>
+          <a:lstStyle/>
+          <a:p>
+            <a:pPr marL="0" indent="0">
+              <a:buNone/>
+            </a:pPr>
+            <a:endParaRPr lang="en-US" dirty="0"/>
+          </a:p>
+        </p:txBody>
+      </p:sp>
+    </p:spTree>
+    <p:extLst>
+      <p:ext uri="{BB962C8B-B14F-4D97-AF65-F5344CB8AC3E}">
+        <p14:creationId xmlns:p14="http://schemas.microsoft.com/office/powerpoint/2010/main" val="4169089809"/>
       </p:ext>
     </p:extLst>
   </p:cSld>
@@ -5557,7 +6797,7 @@
         <p:spPr>
           <a:xfrm>
             <a:off x="1380931" y="181947"/>
-            <a:ext cx="9601200" cy="629816"/>
+            <a:ext cx="9601200" cy="667139"/>
           </a:xfrm>
         </p:spPr>
         <p:txBody>
@@ -5569,17 +6809,17 @@
             <a:pPr algn="ctr"/>
             <a:r>
               <a:rPr lang="en-US" dirty="0"/>
-              <a:t>Discus Results</a:t>
+              <a:t>High Jump Men’s Physical Stats</a:t>
             </a:r>
           </a:p>
         </p:txBody>
       </p:sp>
       <p:pic>
         <p:nvPicPr>
-          <p:cNvPr id="3076" name="Picture 4">
+          <p:cNvPr id="1026" name="Picture 2">
             <a:extLst>
               <a:ext uri="{FF2B5EF4-FFF2-40B4-BE49-F238E27FC236}">
-                <a16:creationId xmlns:a16="http://schemas.microsoft.com/office/drawing/2014/main" id="{E550BF7F-E1CF-4CFC-8E29-5F854DCCF3DA}"/>
+                <a16:creationId xmlns:a16="http://schemas.microsoft.com/office/drawing/2014/main" id="{40FC0277-A6B7-4643-8C3E-D2B738AEC7B1}"/>
               </a:ext>
             </a:extLst>
           </p:cNvPr>
@@ -5605,8 +6845,8 @@
         </p:blipFill>
         <p:spPr bwMode="auto">
           <a:xfrm>
-            <a:off x="1981070" y="989045"/>
-            <a:ext cx="8229859" cy="5616763"/>
+            <a:off x="2341140" y="1367406"/>
+            <a:ext cx="7509720" cy="5006480"/>
           </a:xfrm>
           <a:prstGeom prst="rect">
             <a:avLst/>
@@ -5626,7 +6866,7 @@
     </p:spTree>
     <p:extLst>
       <p:ext uri="{BB962C8B-B14F-4D97-AF65-F5344CB8AC3E}">
-        <p14:creationId xmlns:p14="http://schemas.microsoft.com/office/powerpoint/2010/main" val="1922436959"/>
+        <p14:creationId xmlns:p14="http://schemas.microsoft.com/office/powerpoint/2010/main" val="35261507"/>
       </p:ext>
     </p:extLst>
   </p:cSld>
@@ -5680,7 +6920,7 @@
         <p:spPr>
           <a:xfrm>
             <a:off x="1380931" y="181947"/>
-            <a:ext cx="9601200" cy="629816"/>
+            <a:ext cx="9601200" cy="667139"/>
           </a:xfrm>
         </p:spPr>
         <p:txBody>
@@ -5692,64 +6932,47 @@
             <a:pPr algn="ctr"/>
             <a:r>
               <a:rPr lang="en-US" dirty="0"/>
-              <a:t>Discus Percent Change</a:t>
+              <a:t>High Jump Women’s Physical Stats</a:t>
             </a:r>
           </a:p>
         </p:txBody>
       </p:sp>
       <p:pic>
         <p:nvPicPr>
-          <p:cNvPr id="4100" name="Picture 4">
+          <p:cNvPr id="4" name="Content Placeholder 3">
             <a:extLst>
               <a:ext uri="{FF2B5EF4-FFF2-40B4-BE49-F238E27FC236}">
-                <a16:creationId xmlns:a16="http://schemas.microsoft.com/office/drawing/2014/main" id="{07FE2366-562B-4B60-BAC7-E6867AA2AB1E}"/>
+                <a16:creationId xmlns:a16="http://schemas.microsoft.com/office/drawing/2014/main" id="{BFD77F64-7304-472E-9336-AF2E7251C35B}"/>
               </a:ext>
             </a:extLst>
           </p:cNvPr>
           <p:cNvPicPr>
-            <a:picLocks noGrp="1" noChangeAspect="1" noChangeArrowheads="1"/>
+            <a:picLocks noGrp="1" noChangeAspect="1"/>
           </p:cNvPicPr>
           <p:nvPr>
             <p:ph idx="1"/>
           </p:nvPr>
         </p:nvPicPr>
         <p:blipFill>
-          <a:blip r:embed="rId2">
-            <a:extLst>
-              <a:ext uri="{28A0092B-C50C-407E-A947-70E740481C1C}">
-                <a14:useLocalDpi xmlns:a14="http://schemas.microsoft.com/office/drawing/2010/main" val="0"/>
-              </a:ext>
-            </a:extLst>
-          </a:blip>
-          <a:srcRect/>
+          <a:blip r:embed="rId2"/>
           <a:stretch>
             <a:fillRect/>
           </a:stretch>
         </p:blipFill>
-        <p:spPr bwMode="auto">
-          <a:xfrm>
-            <a:off x="1847966" y="942393"/>
-            <a:ext cx="8496067" cy="5733660"/>
+        <p:spPr>
+          <a:xfrm>
+            <a:off x="2347344" y="1300292"/>
+            <a:ext cx="7618777" cy="5079185"/>
           </a:xfrm>
           <a:prstGeom prst="rect">
             <a:avLst/>
           </a:prstGeom>
-          <a:noFill/>
-          <a:extLst>
-            <a:ext uri="{909E8E84-426E-40DD-AFC4-6F175D3DCCD1}">
-              <a14:hiddenFill xmlns:a14="http://schemas.microsoft.com/office/drawing/2010/main">
-                <a:solidFill>
-                  <a:srgbClr val="FFFFFF"/>
-                </a:solidFill>
-              </a14:hiddenFill>
-            </a:ext>
-          </a:extLst>
         </p:spPr>
       </p:pic>
     </p:spTree>
     <p:extLst>
       <p:ext uri="{BB962C8B-B14F-4D97-AF65-F5344CB8AC3E}">
-        <p14:creationId xmlns:p14="http://schemas.microsoft.com/office/powerpoint/2010/main" val="4095095519"/>
+        <p14:creationId xmlns:p14="http://schemas.microsoft.com/office/powerpoint/2010/main" val="3175620105"/>
       </p:ext>
     </p:extLst>
   </p:cSld>
@@ -5803,7 +7026,7 @@
         <p:spPr>
           <a:xfrm>
             <a:off x="1380931" y="181947"/>
-            <a:ext cx="9601200" cy="676469"/>
+            <a:ext cx="9601200" cy="629816"/>
           </a:xfrm>
         </p:spPr>
         <p:txBody>
@@ -5815,17 +7038,17 @@
             <a:pPr algn="ctr"/>
             <a:r>
               <a:rPr lang="en-US" dirty="0"/>
-              <a:t>100 Meter Results</a:t>
+              <a:t>Discus Results</a:t>
             </a:r>
           </a:p>
         </p:txBody>
       </p:sp>
       <p:pic>
         <p:nvPicPr>
-          <p:cNvPr id="5124" name="Picture 4">
+          <p:cNvPr id="3076" name="Picture 4">
             <a:extLst>
               <a:ext uri="{FF2B5EF4-FFF2-40B4-BE49-F238E27FC236}">
-                <a16:creationId xmlns:a16="http://schemas.microsoft.com/office/drawing/2014/main" id="{10C51C64-049D-4D43-A3EE-4C499B65E03E}"/>
+                <a16:creationId xmlns:a16="http://schemas.microsoft.com/office/drawing/2014/main" id="{E550BF7F-E1CF-4CFC-8E29-5F854DCCF3DA}"/>
               </a:ext>
             </a:extLst>
           </p:cNvPr>
@@ -5851,8 +7074,8 @@
         </p:blipFill>
         <p:spPr bwMode="auto">
           <a:xfrm>
-            <a:off x="2035700" y="998374"/>
-            <a:ext cx="8330609" cy="5628287"/>
+            <a:off x="1981070" y="989045"/>
+            <a:ext cx="8229859" cy="5616763"/>
           </a:xfrm>
           <a:prstGeom prst="rect">
             <a:avLst/>
@@ -5872,7 +7095,7 @@
     </p:spTree>
     <p:extLst>
       <p:ext uri="{BB962C8B-B14F-4D97-AF65-F5344CB8AC3E}">
-        <p14:creationId xmlns:p14="http://schemas.microsoft.com/office/powerpoint/2010/main" val="2578630290"/>
+        <p14:creationId xmlns:p14="http://schemas.microsoft.com/office/powerpoint/2010/main" val="1922436959"/>
       </p:ext>
     </p:extLst>
   </p:cSld>

</xml_diff>